<commit_message>
Minor doc edits and architecture drawing change
</commit_message>
<xml_diff>
--- a/docs/deployment_guide/images/architecture.pptx
+++ b/docs/deployment_guide/images/architecture.pptx
@@ -243,7 +243,7 @@
           <a:p>
             <a:fld id="{A1FEBA9D-EA6E-4D2B-8CDF-4B30E5DE822E}" type="datetimeFigureOut">
               <a:rPr lang="en-US" smtClean="0"/>
-              <a:t>4/6/23</a:t>
+              <a:t>5/10/23</a:t>
             </a:fld>
             <a:endParaRPr lang="en-US"/>
           </a:p>
@@ -413,7 +413,7 @@
           <a:p>
             <a:fld id="{A1FEBA9D-EA6E-4D2B-8CDF-4B30E5DE822E}" type="datetimeFigureOut">
               <a:rPr lang="en-US" smtClean="0"/>
-              <a:t>4/6/23</a:t>
+              <a:t>5/10/23</a:t>
             </a:fld>
             <a:endParaRPr lang="en-US"/>
           </a:p>
@@ -593,7 +593,7 @@
           <a:p>
             <a:fld id="{A1FEBA9D-EA6E-4D2B-8CDF-4B30E5DE822E}" type="datetimeFigureOut">
               <a:rPr lang="en-US" smtClean="0"/>
-              <a:t>4/6/23</a:t>
+              <a:t>5/10/23</a:t>
             </a:fld>
             <a:endParaRPr lang="en-US"/>
           </a:p>
@@ -763,7 +763,7 @@
           <a:p>
             <a:fld id="{A1FEBA9D-EA6E-4D2B-8CDF-4B30E5DE822E}" type="datetimeFigureOut">
               <a:rPr lang="en-US" smtClean="0"/>
-              <a:t>4/6/23</a:t>
+              <a:t>5/10/23</a:t>
             </a:fld>
             <a:endParaRPr lang="en-US"/>
           </a:p>
@@ -1007,7 +1007,7 @@
           <a:p>
             <a:fld id="{A1FEBA9D-EA6E-4D2B-8CDF-4B30E5DE822E}" type="datetimeFigureOut">
               <a:rPr lang="en-US" smtClean="0"/>
-              <a:t>4/6/23</a:t>
+              <a:t>5/10/23</a:t>
             </a:fld>
             <a:endParaRPr lang="en-US"/>
           </a:p>
@@ -1239,7 +1239,7 @@
           <a:p>
             <a:fld id="{A1FEBA9D-EA6E-4D2B-8CDF-4B30E5DE822E}" type="datetimeFigureOut">
               <a:rPr lang="en-US" smtClean="0"/>
-              <a:t>4/6/23</a:t>
+              <a:t>5/10/23</a:t>
             </a:fld>
             <a:endParaRPr lang="en-US"/>
           </a:p>
@@ -1606,7 +1606,7 @@
           <a:p>
             <a:fld id="{A1FEBA9D-EA6E-4D2B-8CDF-4B30E5DE822E}" type="datetimeFigureOut">
               <a:rPr lang="en-US" smtClean="0"/>
-              <a:t>4/6/23</a:t>
+              <a:t>5/10/23</a:t>
             </a:fld>
             <a:endParaRPr lang="en-US"/>
           </a:p>
@@ -1724,7 +1724,7 @@
           <a:p>
             <a:fld id="{A1FEBA9D-EA6E-4D2B-8CDF-4B30E5DE822E}" type="datetimeFigureOut">
               <a:rPr lang="en-US" smtClean="0"/>
-              <a:t>4/6/23</a:t>
+              <a:t>5/10/23</a:t>
             </a:fld>
             <a:endParaRPr lang="en-US"/>
           </a:p>
@@ -1819,7 +1819,7 @@
           <a:p>
             <a:fld id="{A1FEBA9D-EA6E-4D2B-8CDF-4B30E5DE822E}" type="datetimeFigureOut">
               <a:rPr lang="en-US" smtClean="0"/>
-              <a:t>4/6/23</a:t>
+              <a:t>5/10/23</a:t>
             </a:fld>
             <a:endParaRPr lang="en-US"/>
           </a:p>
@@ -2096,7 +2096,7 @@
           <a:p>
             <a:fld id="{A1FEBA9D-EA6E-4D2B-8CDF-4B30E5DE822E}" type="datetimeFigureOut">
               <a:rPr lang="en-US" smtClean="0"/>
-              <a:t>4/6/23</a:t>
+              <a:t>5/10/23</a:t>
             </a:fld>
             <a:endParaRPr lang="en-US"/>
           </a:p>
@@ -2353,7 +2353,7 @@
           <a:p>
             <a:fld id="{A1FEBA9D-EA6E-4D2B-8CDF-4B30E5DE822E}" type="datetimeFigureOut">
               <a:rPr lang="en-US" smtClean="0"/>
-              <a:t>4/6/23</a:t>
+              <a:t>5/10/23</a:t>
             </a:fld>
             <a:endParaRPr lang="en-US"/>
           </a:p>
@@ -2566,7 +2566,7 @@
           <a:p>
             <a:fld id="{A1FEBA9D-EA6E-4D2B-8CDF-4B30E5DE822E}" type="datetimeFigureOut">
               <a:rPr lang="en-US" smtClean="0"/>
-              <a:t>4/6/23</a:t>
+              <a:t>5/10/23</a:t>
             </a:fld>
             <a:endParaRPr lang="en-US"/>
           </a:p>
@@ -3000,7 +3000,7 @@
         </p:blipFill>
         <p:spPr bwMode="auto">
           <a:xfrm>
-            <a:off x="1624002" y="3057886"/>
+            <a:off x="1769563" y="3623565"/>
             <a:ext cx="853821" cy="853821"/>
           </a:xfrm>
           <a:prstGeom prst="rect">
@@ -3047,7 +3047,7 @@
         </p:nvSpPr>
         <p:spPr bwMode="auto">
           <a:xfrm>
-            <a:off x="1297182" y="3865422"/>
+            <a:off x="1442743" y="4431101"/>
             <a:ext cx="1497410" cy="507831"/>
           </a:xfrm>
           <a:prstGeom prst="rect">
@@ -3248,7 +3248,7 @@
         </p:blipFill>
         <p:spPr bwMode="auto">
           <a:xfrm>
-            <a:off x="1624002" y="4493915"/>
+            <a:off x="1769563" y="5059594"/>
             <a:ext cx="853821" cy="853821"/>
           </a:xfrm>
           <a:prstGeom prst="rect">
@@ -3295,7 +3295,7 @@
         </p:nvSpPr>
         <p:spPr bwMode="auto">
           <a:xfrm>
-            <a:off x="1297181" y="5336997"/>
+            <a:off x="1442742" y="5902676"/>
             <a:ext cx="1505606" cy="507831"/>
           </a:xfrm>
           <a:prstGeom prst="rect">
@@ -3469,7 +3469,7 @@
         </p:blipFill>
         <p:spPr bwMode="auto">
           <a:xfrm>
-            <a:off x="1624002" y="5935987"/>
+            <a:off x="1769563" y="6501666"/>
             <a:ext cx="853821" cy="853821"/>
           </a:xfrm>
           <a:prstGeom prst="rect">
@@ -3516,7 +3516,7 @@
         </p:nvSpPr>
         <p:spPr bwMode="auto">
           <a:xfrm>
-            <a:off x="1300885" y="6789808"/>
+            <a:off x="1446446" y="7355487"/>
             <a:ext cx="1501902" cy="300082"/>
           </a:xfrm>
           <a:prstGeom prst="rect">
@@ -3656,227 +3656,6 @@
                 <a:cs typeface="Arial" panose="020B0604020202020204" pitchFamily="34" charset="0"/>
               </a:rPr>
               <a:t>AWS Lambda</a:t>
-            </a:r>
-          </a:p>
-        </p:txBody>
-      </p:sp>
-      <p:pic>
-        <p:nvPicPr>
-          <p:cNvPr id="12" name="Graphic 17">
-            <a:extLst>
-              <a:ext uri="{FF2B5EF4-FFF2-40B4-BE49-F238E27FC236}">
-                <a16:creationId xmlns:a16="http://schemas.microsoft.com/office/drawing/2014/main" id="{9CBBE049-89D9-4901-BD0A-4E1B41A38C1C}"/>
-              </a:ext>
-            </a:extLst>
-          </p:cNvPr>
-          <p:cNvPicPr>
-            <a:picLocks noChangeAspect="1" noChangeArrowheads="1"/>
-          </p:cNvPicPr>
-          <p:nvPr/>
-        </p:nvPicPr>
-        <p:blipFill>
-          <a:blip r:embed="rId5">
-            <a:extLst>
-              <a:ext uri="{28A0092B-C50C-407E-A947-70E740481C1C}">
-                <a14:useLocalDpi xmlns:a14="http://schemas.microsoft.com/office/drawing/2010/main" val="0"/>
-              </a:ext>
-            </a:extLst>
-          </a:blip>
-          <a:srcRect/>
-          <a:stretch>
-            <a:fillRect/>
-          </a:stretch>
-        </p:blipFill>
-        <p:spPr bwMode="auto">
-          <a:xfrm>
-            <a:off x="1618975" y="7181049"/>
-            <a:ext cx="853821" cy="853821"/>
-          </a:xfrm>
-          <a:prstGeom prst="rect">
-            <a:avLst/>
-          </a:prstGeom>
-          <a:noFill/>
-          <a:ln>
-            <a:noFill/>
-          </a:ln>
-          <a:extLst>
-            <a:ext uri="{909E8E84-426E-40DD-AFC4-6F175D3DCCD1}">
-              <a14:hiddenFill xmlns:a14="http://schemas.microsoft.com/office/drawing/2010/main">
-                <a:solidFill>
-                  <a:srgbClr val="FFFFFF"/>
-                </a:solidFill>
-              </a14:hiddenFill>
-            </a:ext>
-            <a:ext uri="{91240B29-F687-4F45-9708-019B960494DF}">
-              <a14:hiddenLine xmlns:a14="http://schemas.microsoft.com/office/drawing/2010/main" w="9525">
-                <a:solidFill>
-                  <a:srgbClr val="000000"/>
-                </a:solidFill>
-                <a:miter lim="800000"/>
-                <a:headEnd/>
-                <a:tailEnd/>
-              </a14:hiddenLine>
-            </a:ext>
-          </a:extLst>
-        </p:spPr>
-      </p:pic>
-      <p:sp>
-        <p:nvSpPr>
-          <p:cNvPr id="13" name="TextBox 11">
-            <a:extLst>
-              <a:ext uri="{FF2B5EF4-FFF2-40B4-BE49-F238E27FC236}">
-                <a16:creationId xmlns:a16="http://schemas.microsoft.com/office/drawing/2014/main" id="{6CEBE909-1A20-49B9-A8F5-98C5539E9BC9}"/>
-              </a:ext>
-            </a:extLst>
-          </p:cNvPr>
-          <p:cNvSpPr txBox="1">
-            <a:spLocks noChangeArrowheads="1"/>
-          </p:cNvSpPr>
-          <p:nvPr/>
-        </p:nvSpPr>
-        <p:spPr bwMode="auto">
-          <a:xfrm>
-            <a:off x="1300885" y="8034871"/>
-            <a:ext cx="1501902" cy="507831"/>
-          </a:xfrm>
-          <a:prstGeom prst="rect">
-            <a:avLst/>
-          </a:prstGeom>
-          <a:noFill/>
-          <a:ln>
-            <a:noFill/>
-          </a:ln>
-          <a:extLst>
-            <a:ext uri="{909E8E84-426E-40DD-AFC4-6F175D3DCCD1}">
-              <a14:hiddenFill xmlns:a14="http://schemas.microsoft.com/office/drawing/2010/main">
-                <a:solidFill>
-                  <a:srgbClr val="FFFFFF"/>
-                </a:solidFill>
-              </a14:hiddenFill>
-            </a:ext>
-            <a:ext uri="{91240B29-F687-4F45-9708-019B960494DF}">
-              <a14:hiddenLine xmlns:a14="http://schemas.microsoft.com/office/drawing/2010/main" w="9525">
-                <a:solidFill>
-                  <a:srgbClr val="000000"/>
-                </a:solidFill>
-                <a:miter lim="800000"/>
-                <a:headEnd/>
-                <a:tailEnd/>
-              </a14:hiddenLine>
-            </a:ext>
-          </a:extLst>
-        </p:spPr>
-        <p:txBody>
-          <a:bodyPr>
-            <a:spAutoFit/>
-          </a:bodyPr>
-          <a:lstStyle>
-            <a:lvl1pPr>
-              <a:defRPr>
-                <a:solidFill>
-                  <a:schemeClr val="tx1"/>
-                </a:solidFill>
-                <a:latin typeface="Calibri" panose="020F0502020204030204" pitchFamily="34" charset="0"/>
-              </a:defRPr>
-            </a:lvl1pPr>
-            <a:lvl2pPr marL="742950" indent="-285750">
-              <a:defRPr>
-                <a:solidFill>
-                  <a:schemeClr val="tx1"/>
-                </a:solidFill>
-                <a:latin typeface="Calibri" panose="020F0502020204030204" pitchFamily="34" charset="0"/>
-              </a:defRPr>
-            </a:lvl2pPr>
-            <a:lvl3pPr marL="1143000" indent="-228600">
-              <a:defRPr>
-                <a:solidFill>
-                  <a:schemeClr val="tx1"/>
-                </a:solidFill>
-                <a:latin typeface="Calibri" panose="020F0502020204030204" pitchFamily="34" charset="0"/>
-              </a:defRPr>
-            </a:lvl3pPr>
-            <a:lvl4pPr marL="1600200" indent="-228600">
-              <a:defRPr>
-                <a:solidFill>
-                  <a:schemeClr val="tx1"/>
-                </a:solidFill>
-                <a:latin typeface="Calibri" panose="020F0502020204030204" pitchFamily="34" charset="0"/>
-              </a:defRPr>
-            </a:lvl4pPr>
-            <a:lvl5pPr marL="2057400" indent="-228600">
-              <a:defRPr>
-                <a:solidFill>
-                  <a:schemeClr val="tx1"/>
-                </a:solidFill>
-                <a:latin typeface="Calibri" panose="020F0502020204030204" pitchFamily="34" charset="0"/>
-              </a:defRPr>
-            </a:lvl5pPr>
-            <a:lvl6pPr marL="2514600" indent="-228600" eaLnBrk="0" fontAlgn="base" hangingPunct="0">
-              <a:spcBef>
-                <a:spcPct val="0"/>
-              </a:spcBef>
-              <a:spcAft>
-                <a:spcPct val="0"/>
-              </a:spcAft>
-              <a:defRPr>
-                <a:solidFill>
-                  <a:schemeClr val="tx1"/>
-                </a:solidFill>
-                <a:latin typeface="Calibri" panose="020F0502020204030204" pitchFamily="34" charset="0"/>
-              </a:defRPr>
-            </a:lvl6pPr>
-            <a:lvl7pPr marL="2971800" indent="-228600" eaLnBrk="0" fontAlgn="base" hangingPunct="0">
-              <a:spcBef>
-                <a:spcPct val="0"/>
-              </a:spcBef>
-              <a:spcAft>
-                <a:spcPct val="0"/>
-              </a:spcAft>
-              <a:defRPr>
-                <a:solidFill>
-                  <a:schemeClr val="tx1"/>
-                </a:solidFill>
-                <a:latin typeface="Calibri" panose="020F0502020204030204" pitchFamily="34" charset="0"/>
-              </a:defRPr>
-            </a:lvl7pPr>
-            <a:lvl8pPr marL="3429000" indent="-228600" eaLnBrk="0" fontAlgn="base" hangingPunct="0">
-              <a:spcBef>
-                <a:spcPct val="0"/>
-              </a:spcBef>
-              <a:spcAft>
-                <a:spcPct val="0"/>
-              </a:spcAft>
-              <a:defRPr>
-                <a:solidFill>
-                  <a:schemeClr val="tx1"/>
-                </a:solidFill>
-                <a:latin typeface="Calibri" panose="020F0502020204030204" pitchFamily="34" charset="0"/>
-              </a:defRPr>
-            </a:lvl8pPr>
-            <a:lvl9pPr marL="3886200" indent="-228600" eaLnBrk="0" fontAlgn="base" hangingPunct="0">
-              <a:spcBef>
-                <a:spcPct val="0"/>
-              </a:spcBef>
-              <a:spcAft>
-                <a:spcPct val="0"/>
-              </a:spcAft>
-              <a:defRPr>
-                <a:solidFill>
-                  <a:schemeClr val="tx1"/>
-                </a:solidFill>
-                <a:latin typeface="Calibri" panose="020F0502020204030204" pitchFamily="34" charset="0"/>
-              </a:defRPr>
-            </a:lvl9pPr>
-          </a:lstStyle>
-          <a:p>
-            <a:pPr algn="ctr" eaLnBrk="1" hangingPunct="1"/>
-            <a:r>
-              <a:rPr lang="en-US" altLang="en-US" sz="1350" dirty="0">
-                <a:latin typeface="Arial" panose="020B0604020202020204" pitchFamily="34" charset="0"/>
-                <a:ea typeface="Amazon Ember" panose="020B0603020204020204" pitchFamily="34" charset="0"/>
-                <a:cs typeface="Arial" panose="020B0604020202020204" pitchFamily="34" charset="0"/>
-              </a:rPr>
-              <a:t>AWS Secrets Manager</a:t>
             </a:r>
           </a:p>
         </p:txBody>
@@ -3962,10 +3741,10 @@
           <p:nvPr/>
         </p:nvPicPr>
         <p:blipFill>
-          <a:blip r:embed="rId6">
+          <a:blip r:embed="rId5">
             <a:extLst>
               <a:ext uri="{96DAC541-7B7A-43D3-8B79-37D633B846F1}">
-                <asvg:svgBlip xmlns:asvg="http://schemas.microsoft.com/office/drawing/2016/SVG/main" r:embed="rId7"/>
+                <asvg:svgBlip xmlns:asvg="http://schemas.microsoft.com/office/drawing/2016/SVG/main" r:embed="rId6"/>
               </a:ext>
             </a:extLst>
           </a:blip>
@@ -4064,10 +3843,10 @@
           <p:nvPr/>
         </p:nvPicPr>
         <p:blipFill>
-          <a:blip r:embed="rId6">
+          <a:blip r:embed="rId5">
             <a:extLst>
               <a:ext uri="{96DAC541-7B7A-43D3-8B79-37D633B846F1}">
-                <asvg:svgBlip xmlns:asvg="http://schemas.microsoft.com/office/drawing/2016/SVG/main" r:embed="rId7"/>
+                <asvg:svgBlip xmlns:asvg="http://schemas.microsoft.com/office/drawing/2016/SVG/main" r:embed="rId6"/>
               </a:ext>
             </a:extLst>
           </a:blip>
@@ -4166,10 +3945,10 @@
           <p:nvPr/>
         </p:nvPicPr>
         <p:blipFill>
-          <a:blip r:embed="rId8">
+          <a:blip r:embed="rId7">
             <a:extLst>
               <a:ext uri="{96DAC541-7B7A-43D3-8B79-37D633B846F1}">
-                <asvg:svgBlip xmlns:asvg="http://schemas.microsoft.com/office/drawing/2016/SVG/main" r:embed="rId9"/>
+                <asvg:svgBlip xmlns:asvg="http://schemas.microsoft.com/office/drawing/2016/SVG/main" r:embed="rId8"/>
               </a:ext>
             </a:extLst>
           </a:blip>
@@ -4268,10 +4047,10 @@
           <p:nvPr/>
         </p:nvPicPr>
         <p:blipFill>
-          <a:blip r:embed="rId8">
+          <a:blip r:embed="rId7">
             <a:extLst>
               <a:ext uri="{96DAC541-7B7A-43D3-8B79-37D633B846F1}">
-                <asvg:svgBlip xmlns:asvg="http://schemas.microsoft.com/office/drawing/2016/SVG/main" r:embed="rId9"/>
+                <asvg:svgBlip xmlns:asvg="http://schemas.microsoft.com/office/drawing/2016/SVG/main" r:embed="rId8"/>
               </a:ext>
             </a:extLst>
           </a:blip>
@@ -4616,7 +4395,7 @@
           <p:nvPr/>
         </p:nvPicPr>
         <p:blipFill>
-          <a:blip r:embed="rId10">
+          <a:blip r:embed="rId9">
             <a:extLst>
               <a:ext uri="{28A0092B-C50C-407E-A947-70E740481C1C}">
                 <a14:useLocalDpi xmlns:a14="http://schemas.microsoft.com/office/drawing/2010/main" val="0"/>
@@ -4852,7 +4631,7 @@
           <p:nvPr/>
         </p:nvPicPr>
         <p:blipFill>
-          <a:blip r:embed="rId10">
+          <a:blip r:embed="rId9">
             <a:extLst>
               <a:ext uri="{28A0092B-C50C-407E-A947-70E740481C1C}">
                 <a14:useLocalDpi xmlns:a14="http://schemas.microsoft.com/office/drawing/2010/main" val="0"/>
@@ -4912,7 +4691,7 @@
           <p:nvPr/>
         </p:nvPicPr>
         <p:blipFill>
-          <a:blip r:embed="rId11">
+          <a:blip r:embed="rId10">
             <a:extLst>
               <a:ext uri="{28A0092B-C50C-407E-A947-70E740481C1C}">
                 <a14:useLocalDpi xmlns:a14="http://schemas.microsoft.com/office/drawing/2010/main" val="0"/>
@@ -5327,7 +5106,7 @@
           <p:nvPr/>
         </p:nvPicPr>
         <p:blipFill>
-          <a:blip r:embed="rId12">
+          <a:blip r:embed="rId11">
             <a:extLst>
               <a:ext uri="{28A0092B-C50C-407E-A947-70E740481C1C}">
                 <a14:useLocalDpi xmlns:a14="http://schemas.microsoft.com/office/drawing/2010/main" val="0"/>
@@ -5387,7 +5166,7 @@
           <p:nvPr/>
         </p:nvPicPr>
         <p:blipFill>
-          <a:blip r:embed="rId13">
+          <a:blip r:embed="rId12">
             <a:extLst>
               <a:ext uri="{28A0092B-C50C-407E-A947-70E740481C1C}">
                 <a14:useLocalDpi xmlns:a14="http://schemas.microsoft.com/office/drawing/2010/main" val="0"/>
@@ -5619,7 +5398,7 @@
           <p:nvPr/>
         </p:nvPicPr>
         <p:blipFill>
-          <a:blip r:embed="rId13">
+          <a:blip r:embed="rId12">
             <a:extLst>
               <a:ext uri="{28A0092B-C50C-407E-A947-70E740481C1C}">
                 <a14:useLocalDpi xmlns:a14="http://schemas.microsoft.com/office/drawing/2010/main" val="0"/>
@@ -6012,7 +5791,7 @@
           <p:nvPr/>
         </p:nvPicPr>
         <p:blipFill>
-          <a:blip r:embed="rId14">
+          <a:blip r:embed="rId13">
             <a:extLst>
               <a:ext uri="{28A0092B-C50C-407E-A947-70E740481C1C}">
                 <a14:useLocalDpi xmlns:a14="http://schemas.microsoft.com/office/drawing/2010/main" val="0"/>
@@ -6233,7 +6012,7 @@
           <p:nvPr/>
         </p:nvPicPr>
         <p:blipFill>
-          <a:blip r:embed="rId14">
+          <a:blip r:embed="rId13">
             <a:extLst>
               <a:ext uri="{28A0092B-C50C-407E-A947-70E740481C1C}">
                 <a14:useLocalDpi xmlns:a14="http://schemas.microsoft.com/office/drawing/2010/main" val="0"/>
@@ -6454,7 +6233,7 @@
           <p:nvPr/>
         </p:nvPicPr>
         <p:blipFill>
-          <a:blip r:embed="rId15">
+          <a:blip r:embed="rId14">
             <a:extLst>
               <a:ext uri="{28A0092B-C50C-407E-A947-70E740481C1C}">
                 <a14:useLocalDpi xmlns:a14="http://schemas.microsoft.com/office/drawing/2010/main" val="0"/>
@@ -6575,10 +6354,10 @@
           <p:nvPr/>
         </p:nvPicPr>
         <p:blipFill>
-          <a:blip r:embed="rId16">
+          <a:blip r:embed="rId15">
             <a:extLst>
               <a:ext uri="{96DAC541-7B7A-43D3-8B79-37D633B846F1}">
-                <asvg:svgBlip xmlns:asvg="http://schemas.microsoft.com/office/drawing/2016/SVG/main" r:embed="rId17"/>
+                <asvg:svgBlip xmlns:asvg="http://schemas.microsoft.com/office/drawing/2016/SVG/main" r:embed="rId16"/>
               </a:ext>
             </a:extLst>
           </a:blip>
@@ -6860,10 +6639,10 @@
           <p:nvPr/>
         </p:nvPicPr>
         <p:blipFill>
-          <a:blip r:embed="rId18">
+          <a:blip r:embed="rId17">
             <a:extLst>
               <a:ext uri="{96DAC541-7B7A-43D3-8B79-37D633B846F1}">
-                <asvg:svgBlip xmlns:asvg="http://schemas.microsoft.com/office/drawing/2016/SVG/main" r:embed="rId19"/>
+                <asvg:svgBlip xmlns:asvg="http://schemas.microsoft.com/office/drawing/2016/SVG/main" r:embed="rId18"/>
               </a:ext>
             </a:extLst>
           </a:blip>

</xml_diff>